<commit_message>
update joining table soulution
</commit_message>
<xml_diff>
--- a/XI class/01. OOP - Module 1/08. Агрегатни типове/Агрегатни типове.pptx
+++ b/XI class/01. OOP - Module 1/08. Агрегатни типове/Агрегатни типове.pptx
@@ -111,6 +111,11 @@
       </a:defRPr>
     </a:lvl9pPr>
   </p:defaultTextStyle>
+  <p:extLst>
+    <p:ext uri="{EFAFB233-063F-42B5-8137-9DF3F51BA10A}">
+      <p15:sldGuideLst xmlns:p15="http://schemas.microsoft.com/office/powerpoint/2012/main"/>
+    </p:ext>
+  </p:extLst>
 </p:presentation>
 </file>
 
@@ -608,7 +613,7 @@
           <a:p>
             <a:fld id="{3A25CD2D-AB90-46C2-A783-80396CF1CFF5}" type="datetimeFigureOut">
               <a:rPr lang="en-GB" smtClean="0"/>
-              <a:t>10/12/2023</a:t>
+              <a:t>01/12/2024</a:t>
             </a:fld>
             <a:endParaRPr lang="en-GB"/>
           </a:p>
@@ -808,7 +813,7 @@
           <a:p>
             <a:fld id="{3A25CD2D-AB90-46C2-A783-80396CF1CFF5}" type="datetimeFigureOut">
               <a:rPr lang="en-GB" smtClean="0"/>
-              <a:t>10/12/2023</a:t>
+              <a:t>01/12/2024</a:t>
             </a:fld>
             <a:endParaRPr lang="en-GB"/>
           </a:p>
@@ -1018,7 +1023,7 @@
           <a:p>
             <a:fld id="{3A25CD2D-AB90-46C2-A783-80396CF1CFF5}" type="datetimeFigureOut">
               <a:rPr lang="en-GB" smtClean="0"/>
-              <a:t>10/12/2023</a:t>
+              <a:t>01/12/2024</a:t>
             </a:fld>
             <a:endParaRPr lang="en-GB"/>
           </a:p>
@@ -1218,7 +1223,7 @@
           <a:p>
             <a:fld id="{3A25CD2D-AB90-46C2-A783-80396CF1CFF5}" type="datetimeFigureOut">
               <a:rPr lang="en-GB" smtClean="0"/>
-              <a:t>10/12/2023</a:t>
+              <a:t>01/12/2024</a:t>
             </a:fld>
             <a:endParaRPr lang="en-GB"/>
           </a:p>
@@ -1494,7 +1499,7 @@
           <a:p>
             <a:fld id="{3A25CD2D-AB90-46C2-A783-80396CF1CFF5}" type="datetimeFigureOut">
               <a:rPr lang="en-GB" smtClean="0"/>
-              <a:t>10/12/2023</a:t>
+              <a:t>01/12/2024</a:t>
             </a:fld>
             <a:endParaRPr lang="en-GB"/>
           </a:p>
@@ -1762,7 +1767,7 @@
           <a:p>
             <a:fld id="{3A25CD2D-AB90-46C2-A783-80396CF1CFF5}" type="datetimeFigureOut">
               <a:rPr lang="en-GB" smtClean="0"/>
-              <a:t>10/12/2023</a:t>
+              <a:t>01/12/2024</a:t>
             </a:fld>
             <a:endParaRPr lang="en-GB"/>
           </a:p>
@@ -2177,7 +2182,7 @@
           <a:p>
             <a:fld id="{3A25CD2D-AB90-46C2-A783-80396CF1CFF5}" type="datetimeFigureOut">
               <a:rPr lang="en-GB" smtClean="0"/>
-              <a:t>10/12/2023</a:t>
+              <a:t>01/12/2024</a:t>
             </a:fld>
             <a:endParaRPr lang="en-GB"/>
           </a:p>
@@ -2319,7 +2324,7 @@
           <a:p>
             <a:fld id="{3A25CD2D-AB90-46C2-A783-80396CF1CFF5}" type="datetimeFigureOut">
               <a:rPr lang="en-GB" smtClean="0"/>
-              <a:t>10/12/2023</a:t>
+              <a:t>01/12/2024</a:t>
             </a:fld>
             <a:endParaRPr lang="en-GB"/>
           </a:p>
@@ -2432,7 +2437,7 @@
           <a:p>
             <a:fld id="{3A25CD2D-AB90-46C2-A783-80396CF1CFF5}" type="datetimeFigureOut">
               <a:rPr lang="en-GB" smtClean="0"/>
-              <a:t>10/12/2023</a:t>
+              <a:t>01/12/2024</a:t>
             </a:fld>
             <a:endParaRPr lang="en-GB"/>
           </a:p>
@@ -2745,7 +2750,7 @@
           <a:p>
             <a:fld id="{3A25CD2D-AB90-46C2-A783-80396CF1CFF5}" type="datetimeFigureOut">
               <a:rPr lang="en-GB" smtClean="0"/>
-              <a:t>10/12/2023</a:t>
+              <a:t>01/12/2024</a:t>
             </a:fld>
             <a:endParaRPr lang="en-GB"/>
           </a:p>
@@ -3034,7 +3039,7 @@
           <a:p>
             <a:fld id="{3A25CD2D-AB90-46C2-A783-80396CF1CFF5}" type="datetimeFigureOut">
               <a:rPr lang="en-GB" smtClean="0"/>
-              <a:t>10/12/2023</a:t>
+              <a:t>01/12/2024</a:t>
             </a:fld>
             <a:endParaRPr lang="en-GB"/>
           </a:p>
@@ -3277,7 +3282,7 @@
           <a:p>
             <a:fld id="{3A25CD2D-AB90-46C2-A783-80396CF1CFF5}" type="datetimeFigureOut">
               <a:rPr lang="en-GB" smtClean="0"/>
-              <a:t>10/12/2023</a:t>
+              <a:t>01/12/2024</a:t>
             </a:fld>
             <a:endParaRPr lang="en-GB"/>
           </a:p>

</xml_diff>